<commit_message>
Add RVC and LSE presentations
</commit_message>
<xml_diff>
--- a/presentations/round-the-room-20161214.pptx
+++ b/presentations/round-the-room-20161214.pptx
@@ -7,11 +7,13 @@
   <p:sldIdLst>
     <p:sldId id="257" r:id="rId2"/>
     <p:sldId id="259" r:id="rId3"/>
+    <p:sldId id="260" r:id="rId4"/>
+    <p:sldId id="262" r:id="rId5"/>
   </p:sldIdLst>
   <p:sldSz cx="12192000" cy="6858000"/>
   <p:notesSz cx="6858000" cy="9144000"/>
   <p:custDataLst>
-    <p:tags r:id="rId4"/>
+    <p:tags r:id="rId6"/>
   </p:custDataLst>
   <p:defaultTextStyle>
     <a:defPPr>
@@ -108,6 +110,11 @@
       </a:defRPr>
     </a:lvl9pPr>
   </p:defaultTextStyle>
+  <p:extLst>
+    <p:ext uri="{EFAFB233-063F-42B5-8137-9DF3F51BA10A}">
+      <p15:sldGuideLst xmlns="" xmlns:p15="http://schemas.microsoft.com/office/powerpoint/2012/main"/>
+    </p:ext>
+  </p:extLst>
 </p:presentation>
 </file>
 
@@ -242,7 +249,7 @@
           <a:p>
             <a:fld id="{A2AF6A15-003A-4C4D-8E82-07477167E09C}" type="datetimeFigureOut">
               <a:rPr lang="en-GB" smtClean="0"/>
-              <a:t>24/11/2016</a:t>
+              <a:t>13/12/2016</a:t>
             </a:fld>
             <a:endParaRPr lang="en-GB"/>
           </a:p>
@@ -412,7 +419,7 @@
           <a:p>
             <a:fld id="{A2AF6A15-003A-4C4D-8E82-07477167E09C}" type="datetimeFigureOut">
               <a:rPr lang="en-GB" smtClean="0"/>
-              <a:t>24/11/2016</a:t>
+              <a:t>13/12/2016</a:t>
             </a:fld>
             <a:endParaRPr lang="en-GB"/>
           </a:p>
@@ -592,7 +599,7 @@
           <a:p>
             <a:fld id="{A2AF6A15-003A-4C4D-8E82-07477167E09C}" type="datetimeFigureOut">
               <a:rPr lang="en-GB" smtClean="0"/>
-              <a:t>24/11/2016</a:t>
+              <a:t>13/12/2016</a:t>
             </a:fld>
             <a:endParaRPr lang="en-GB"/>
           </a:p>
@@ -762,7 +769,7 @@
           <a:p>
             <a:fld id="{A2AF6A15-003A-4C4D-8E82-07477167E09C}" type="datetimeFigureOut">
               <a:rPr lang="en-GB" smtClean="0"/>
-              <a:t>24/11/2016</a:t>
+              <a:t>13/12/2016</a:t>
             </a:fld>
             <a:endParaRPr lang="en-GB"/>
           </a:p>
@@ -1008,7 +1015,7 @@
           <a:p>
             <a:fld id="{A2AF6A15-003A-4C4D-8E82-07477167E09C}" type="datetimeFigureOut">
               <a:rPr lang="en-GB" smtClean="0"/>
-              <a:t>24/11/2016</a:t>
+              <a:t>13/12/2016</a:t>
             </a:fld>
             <a:endParaRPr lang="en-GB"/>
           </a:p>
@@ -1240,7 +1247,7 @@
           <a:p>
             <a:fld id="{A2AF6A15-003A-4C4D-8E82-07477167E09C}" type="datetimeFigureOut">
               <a:rPr lang="en-GB" smtClean="0"/>
-              <a:t>24/11/2016</a:t>
+              <a:t>13/12/2016</a:t>
             </a:fld>
             <a:endParaRPr lang="en-GB"/>
           </a:p>
@@ -1607,7 +1614,7 @@
           <a:p>
             <a:fld id="{A2AF6A15-003A-4C4D-8E82-07477167E09C}" type="datetimeFigureOut">
               <a:rPr lang="en-GB" smtClean="0"/>
-              <a:t>24/11/2016</a:t>
+              <a:t>13/12/2016</a:t>
             </a:fld>
             <a:endParaRPr lang="en-GB"/>
           </a:p>
@@ -1725,7 +1732,7 @@
           <a:p>
             <a:fld id="{A2AF6A15-003A-4C4D-8E82-07477167E09C}" type="datetimeFigureOut">
               <a:rPr lang="en-GB" smtClean="0"/>
-              <a:t>24/11/2016</a:t>
+              <a:t>13/12/2016</a:t>
             </a:fld>
             <a:endParaRPr lang="en-GB"/>
           </a:p>
@@ -1820,7 +1827,7 @@
           <a:p>
             <a:fld id="{A2AF6A15-003A-4C4D-8E82-07477167E09C}" type="datetimeFigureOut">
               <a:rPr lang="en-GB" smtClean="0"/>
-              <a:t>24/11/2016</a:t>
+              <a:t>13/12/2016</a:t>
             </a:fld>
             <a:endParaRPr lang="en-GB"/>
           </a:p>
@@ -2097,7 +2104,7 @@
           <a:p>
             <a:fld id="{A2AF6A15-003A-4C4D-8E82-07477167E09C}" type="datetimeFigureOut">
               <a:rPr lang="en-GB" smtClean="0"/>
-              <a:t>24/11/2016</a:t>
+              <a:t>13/12/2016</a:t>
             </a:fld>
             <a:endParaRPr lang="en-GB"/>
           </a:p>
@@ -2350,7 +2357,7 @@
           <a:p>
             <a:fld id="{A2AF6A15-003A-4C4D-8E82-07477167E09C}" type="datetimeFigureOut">
               <a:rPr lang="en-GB" smtClean="0"/>
-              <a:t>24/11/2016</a:t>
+              <a:t>13/12/2016</a:t>
             </a:fld>
             <a:endParaRPr lang="en-GB"/>
           </a:p>
@@ -2563,7 +2570,7 @@
           <a:p>
             <a:fld id="{A2AF6A15-003A-4C4D-8E82-07477167E09C}" type="datetimeFigureOut">
               <a:rPr lang="en-GB" smtClean="0"/>
-              <a:t>24/11/2016</a:t>
+              <a:t>13/12/2016</a:t>
             </a:fld>
             <a:endParaRPr lang="en-GB"/>
           </a:p>
@@ -2985,7 +2992,7 @@
           <a:p>
             <a:r>
               <a:rPr lang="en-GB" dirty="0" smtClean="0"/>
-              <a:t>&lt;Institution name&gt;</a:t>
+              <a:t>The Royal Veterinary College</a:t>
             </a:r>
             <a:endParaRPr lang="en-GB" dirty="0"/>
           </a:p>
@@ -3003,13 +3010,13 @@
         </p:nvSpPr>
         <p:spPr>
           <a:xfrm>
-            <a:off x="838200" y="1816915"/>
-            <a:ext cx="10515600" cy="4653553"/>
+            <a:off x="838200" y="1690689"/>
+            <a:ext cx="10515600" cy="4779780"/>
           </a:xfrm>
         </p:spPr>
         <p:txBody>
           <a:bodyPr>
-            <a:normAutofit/>
+            <a:normAutofit lnSpcReduction="10000"/>
           </a:bodyPr>
           <a:lstStyle/>
           <a:p>
@@ -3024,21 +3031,28 @@
           <a:p>
             <a:r>
               <a:rPr lang="en-GB" sz="1800" dirty="0" smtClean="0"/>
-              <a:t>e.g. Turnitin, </a:t>
+              <a:t>Echo360 ALP, </a:t>
             </a:r>
             <a:r>
               <a:rPr lang="en-GB" sz="1800" dirty="0" err="1" smtClean="0"/>
-              <a:t>CampusPack</a:t>
+              <a:t>Panopto</a:t>
             </a:r>
             <a:r>
               <a:rPr lang="en-GB" sz="1800" dirty="0" smtClean="0"/>
-              <a:t>, WordPress, Mahara etc...</a:t>
-            </a:r>
-          </a:p>
-          <a:p>
-            <a:pPr marL="0" indent="0">
-              <a:buNone/>
-            </a:pPr>
+              <a:t>, Turnitin V2, </a:t>
+            </a:r>
+            <a:r>
+              <a:rPr lang="en-GB" sz="1800" dirty="0" err="1" smtClean="0"/>
+              <a:t>Mahara</a:t>
+            </a:r>
+            <a:r>
+              <a:rPr lang="en-GB" sz="1800" dirty="0" smtClean="0"/>
+              <a:t>, </a:t>
+            </a:r>
+            <a:r>
+              <a:rPr lang="en-GB" sz="1800" dirty="0" err="1" smtClean="0"/>
+              <a:t>WebPA</a:t>
+            </a:r>
             <a:endParaRPr lang="en-GB" sz="2000" dirty="0" smtClean="0"/>
           </a:p>
           <a:p>
@@ -3053,13 +3067,76 @@
           <a:p>
             <a:r>
               <a:rPr lang="en-GB" sz="1800" dirty="0" smtClean="0"/>
-              <a:t>e.g. Turnitin plugs into Moodle Assignments and can be used separately.</a:t>
-            </a:r>
-          </a:p>
-          <a:p>
-            <a:pPr marL="0" indent="0">
-              <a:buNone/>
-            </a:pPr>
+              <a:t>TII V2 as plagiarism checkpoints. Coursework as formative &amp; summative submission areas.</a:t>
+            </a:r>
+          </a:p>
+          <a:p>
+            <a:r>
+              <a:rPr lang="en-GB" sz="1800" dirty="0" smtClean="0"/>
+              <a:t>Echo360 for Lecture Capture, </a:t>
+            </a:r>
+            <a:r>
+              <a:rPr lang="en-GB" sz="1800" dirty="0"/>
+              <a:t>s</a:t>
+            </a:r>
+            <a:r>
+              <a:rPr lang="en-GB" sz="1800" dirty="0" smtClean="0"/>
+              <a:t>ome public unlisted embedding in Moodle</a:t>
+            </a:r>
+          </a:p>
+          <a:p>
+            <a:r>
+              <a:rPr lang="en-GB" sz="1800" dirty="0" err="1" smtClean="0"/>
+              <a:t>Panopto</a:t>
+            </a:r>
+            <a:r>
+              <a:rPr lang="en-GB" sz="1800" dirty="0" smtClean="0"/>
+              <a:t> as Video Content Management System </a:t>
+            </a:r>
+            <a:r>
+              <a:rPr lang="mr-IN" sz="1800" dirty="0" smtClean="0"/>
+              <a:t>–</a:t>
+            </a:r>
+            <a:r>
+              <a:rPr lang="en-GB" sz="1800" dirty="0" smtClean="0"/>
+              <a:t> to upload videos within Moodle (in theory) securely</a:t>
+            </a:r>
+          </a:p>
+          <a:p>
+            <a:r>
+              <a:rPr lang="en-GB" sz="1800" dirty="0" err="1" smtClean="0"/>
+              <a:t>Mahara</a:t>
+            </a:r>
+            <a:r>
+              <a:rPr lang="en-GB" sz="1800" dirty="0" smtClean="0"/>
+              <a:t> as BSc </a:t>
+            </a:r>
+            <a:r>
+              <a:rPr lang="en-GB" sz="1800" dirty="0" err="1" smtClean="0"/>
+              <a:t>ePortfolio</a:t>
+            </a:r>
+            <a:r>
+              <a:rPr lang="en-GB" sz="1800" dirty="0" smtClean="0"/>
+              <a:t> </a:t>
+            </a:r>
+            <a:r>
+              <a:rPr lang="mr-IN" sz="1800" dirty="0" smtClean="0"/>
+              <a:t>–</a:t>
+            </a:r>
+            <a:r>
+              <a:rPr lang="en-GB" sz="1800" dirty="0" smtClean="0"/>
+              <a:t> limited use</a:t>
+            </a:r>
+          </a:p>
+          <a:p>
+            <a:r>
+              <a:rPr lang="en-GB" sz="1800" dirty="0" err="1" smtClean="0"/>
+              <a:t>WebPA</a:t>
+            </a:r>
+            <a:r>
+              <a:rPr lang="en-GB" sz="1800" dirty="0" smtClean="0"/>
+              <a:t> to support increasing numbers &amp; existing PA practice</a:t>
+            </a:r>
             <a:endParaRPr lang="en-GB" sz="2000" dirty="0"/>
           </a:p>
           <a:p>
@@ -3073,15 +3150,52 @@
           </a:p>
           <a:p>
             <a:r>
+              <a:rPr lang="en-GB" sz="1800" dirty="0" err="1" smtClean="0"/>
+              <a:t>WebPA</a:t>
+            </a:r>
+            <a:r>
               <a:rPr lang="en-GB" sz="1800" dirty="0" smtClean="0"/>
-              <a:t>e.g. Turnitin bugs can affect student confidence in the system and delay marking.</a:t>
-            </a:r>
-          </a:p>
-          <a:p>
-            <a:pPr marL="0" indent="0">
-              <a:buNone/>
-            </a:pPr>
-            <a:endParaRPr lang="en-GB" sz="2400" dirty="0" smtClean="0"/>
+              <a:t> lack of maintenance &amp; integration with Moodle =&gt; A LOT of manual accounts, set up of groups  </a:t>
+            </a:r>
+            <a:r>
+              <a:rPr lang="en-GB" sz="1800" dirty="0" err="1" smtClean="0"/>
+              <a:t>etc</a:t>
+            </a:r>
+            <a:endParaRPr lang="en-GB" sz="1800" dirty="0" smtClean="0"/>
+          </a:p>
+          <a:p>
+            <a:r>
+              <a:rPr lang="en-GB" sz="1800" dirty="0" err="1" smtClean="0"/>
+              <a:t>Mahara</a:t>
+            </a:r>
+            <a:r>
+              <a:rPr lang="en-GB" sz="1800" dirty="0" smtClean="0"/>
+              <a:t> a real open source success </a:t>
+            </a:r>
+            <a:r>
+              <a:rPr lang="mr-IN" sz="1800" dirty="0" smtClean="0"/>
+              <a:t>–</a:t>
+            </a:r>
+            <a:r>
+              <a:rPr lang="en-GB" sz="1800" dirty="0" smtClean="0"/>
+              <a:t> just lack of usage of the technology by students &amp; staff</a:t>
+            </a:r>
+          </a:p>
+          <a:p>
+            <a:r>
+              <a:rPr lang="en-GB" sz="1800" dirty="0" smtClean="0"/>
+              <a:t>Coursework alleviates our issues with TII &amp; streamlined the marking process + improved feedback</a:t>
+            </a:r>
+          </a:p>
+          <a:p>
+            <a:r>
+              <a:rPr lang="en-GB" sz="1800" dirty="0" err="1" smtClean="0"/>
+              <a:t>Panopto</a:t>
+            </a:r>
+            <a:r>
+              <a:rPr lang="en-GB" sz="1800" dirty="0" smtClean="0"/>
+              <a:t> a failure but hope on the horizon(?)</a:t>
+            </a:r>
           </a:p>
           <a:p>
             <a:endParaRPr lang="en-GB" sz="2400" dirty="0"/>
@@ -3139,10 +3253,9 @@
           <a:lstStyle/>
           <a:p>
             <a:r>
-              <a:rPr lang="en-GB" dirty="0" smtClean="0"/>
-              <a:t>&lt;Institution name&gt;</a:t>
-            </a:r>
-            <a:endParaRPr lang="en-GB" dirty="0"/>
+              <a:rPr lang="en-GB" dirty="0"/>
+              <a:t>The Royal Veterinary College</a:t>
+            </a:r>
           </a:p>
         </p:txBody>
       </p:sp>
@@ -3158,8 +3271,8 @@
         </p:nvSpPr>
         <p:spPr>
           <a:xfrm>
-            <a:off x="838199" y="1816915"/>
-            <a:ext cx="10630989" cy="4653553"/>
+            <a:off x="723901" y="1447801"/>
+            <a:ext cx="10745288" cy="5022668"/>
           </a:xfrm>
         </p:spPr>
         <p:txBody>
@@ -3183,23 +3296,8 @@
               </a:lnSpc>
             </a:pPr>
             <a:r>
-              <a:rPr lang="en-GB" sz="1800" dirty="0"/>
-              <a:t>e.g. ever increasing support demands as Moodle usage increases.</a:t>
-            </a:r>
-          </a:p>
-          <a:p>
-            <a:pPr marL="0" indent="0">
-              <a:buNone/>
-            </a:pPr>
-            <a:endParaRPr lang="en-GB" sz="2000" dirty="0" smtClean="0"/>
-          </a:p>
-          <a:p>
-            <a:pPr marL="0" indent="0">
-              <a:buNone/>
-            </a:pPr>
-            <a:r>
-              <a:rPr lang="en-GB" sz="2000" dirty="0" smtClean="0"/>
-              <a:t>Ideas for future development</a:t>
+              <a:rPr lang="en-GB" sz="1600" dirty="0" smtClean="0"/>
+              <a:t>ULCC</a:t>
             </a:r>
           </a:p>
           <a:p>
@@ -3209,42 +3307,8 @@
               </a:lnSpc>
             </a:pPr>
             <a:r>
-              <a:rPr lang="en-GB" sz="1800" dirty="0" smtClean="0"/>
-              <a:t>e.g</a:t>
-            </a:r>
-            <a:r>
-              <a:rPr lang="en-GB" sz="1800" dirty="0"/>
-              <a:t>. </a:t>
-            </a:r>
-            <a:r>
-              <a:rPr lang="en-GB" sz="1800" dirty="0"/>
-              <a:t>We want to implement </a:t>
-            </a:r>
-            <a:r>
-              <a:rPr lang="en-GB" sz="1800" dirty="0" err="1"/>
-              <a:t>behat</a:t>
-            </a:r>
-            <a:r>
-              <a:rPr lang="en-GB" sz="1800" dirty="0"/>
-              <a:t> testing.</a:t>
-            </a:r>
-          </a:p>
-          <a:p>
-            <a:pPr marL="0" indent="0">
-              <a:buNone/>
-            </a:pPr>
-            <a:r>
-              <a:rPr lang="en-GB" sz="2000" dirty="0" smtClean="0"/>
-              <a:t> </a:t>
-            </a:r>
-          </a:p>
-          <a:p>
-            <a:pPr marL="0" indent="0">
-              <a:buNone/>
-            </a:pPr>
-            <a:r>
-              <a:rPr lang="en-GB" sz="2000" dirty="0" smtClean="0"/>
-              <a:t>What do you see as collaboration opportunities?</a:t>
+              <a:rPr lang="en-GB" sz="1600" dirty="0" smtClean="0"/>
+              <a:t>Increasing number of Moodle core bugs in need of fixing</a:t>
             </a:r>
           </a:p>
           <a:p>
@@ -3254,24 +3318,8 @@
               </a:lnSpc>
             </a:pPr>
             <a:r>
-              <a:rPr lang="en-GB" sz="1800" dirty="0" smtClean="0"/>
-              <a:t>e.g</a:t>
-            </a:r>
-            <a:r>
-              <a:rPr lang="en-GB" sz="1800" dirty="0"/>
-              <a:t>. </a:t>
-            </a:r>
-            <a:r>
-              <a:rPr lang="en-GB" sz="1800" dirty="0"/>
-              <a:t>sharing </a:t>
-            </a:r>
-            <a:r>
-              <a:rPr lang="en-GB" sz="1800" dirty="0" err="1"/>
-              <a:t>behat</a:t>
-            </a:r>
-            <a:r>
-              <a:rPr lang="en-GB" sz="1800" dirty="0"/>
-              <a:t> script development.</a:t>
+              <a:rPr lang="en-GB" sz="1600" dirty="0" smtClean="0"/>
+              <a:t>Support load eating into capacity to develop platform</a:t>
             </a:r>
           </a:p>
           <a:p>
@@ -3280,7 +3328,60 @@
             </a:pPr>
             <a:r>
               <a:rPr lang="en-GB" sz="2000" dirty="0" smtClean="0"/>
+              <a:t>Ideas for future development</a:t>
+            </a:r>
+          </a:p>
+          <a:p>
+            <a:r>
+              <a:rPr lang="en-GB" sz="1600" dirty="0" smtClean="0"/>
+              <a:t>UI/UX for courses with A LOT of content + User Tours</a:t>
+            </a:r>
+          </a:p>
+          <a:p>
+            <a:r>
+              <a:rPr lang="en-GB" sz="1600" dirty="0" smtClean="0"/>
+              <a:t>Offline Mobile Moodle </a:t>
+            </a:r>
+            <a:r>
+              <a:rPr lang="mr-IN" sz="1600" dirty="0" smtClean="0"/>
+              <a:t>–</a:t>
+            </a:r>
+            <a:r>
+              <a:rPr lang="en-GB" sz="1600" dirty="0" smtClean="0"/>
               <a:t> </a:t>
+            </a:r>
+            <a:r>
+              <a:rPr lang="en-GB" sz="1600" dirty="0" err="1" smtClean="0"/>
+              <a:t>CampusM</a:t>
+            </a:r>
+            <a:r>
+              <a:rPr lang="en-GB" sz="1600" dirty="0" smtClean="0"/>
+              <a:t>/Moodle official apps</a:t>
+            </a:r>
+          </a:p>
+          <a:p>
+            <a:pPr marL="0" indent="0">
+              <a:buNone/>
+            </a:pPr>
+            <a:r>
+              <a:rPr lang="en-GB" sz="2000" dirty="0" smtClean="0"/>
+              <a:t>What do you see as collaboration opportunities?</a:t>
+            </a:r>
+          </a:p>
+          <a:p>
+            <a:r>
+              <a:rPr lang="en-GB" sz="1600" dirty="0" err="1" smtClean="0"/>
+              <a:t>Behat</a:t>
+            </a:r>
+            <a:r>
+              <a:rPr lang="en-GB" sz="1600" dirty="0" smtClean="0"/>
+              <a:t> Testing</a:t>
+            </a:r>
+          </a:p>
+          <a:p>
+            <a:r>
+              <a:rPr lang="en-GB" sz="1600" dirty="0" smtClean="0"/>
+              <a:t>Assessment</a:t>
             </a:r>
           </a:p>
           <a:p>
@@ -3300,11 +3401,11 @@
             </a:pPr>
             <a:r>
               <a:rPr lang="en-GB" sz="1800" dirty="0" smtClean="0"/>
-              <a:t>e.g</a:t>
+              <a:t>meeting </a:t>
             </a:r>
             <a:r>
               <a:rPr lang="en-GB" sz="1800" dirty="0"/>
-              <a:t>. meeting as a group face to face (or virtually at a particular time via </a:t>
+              <a:t>as a group face to face (or virtually at a particular time via </a:t>
             </a:r>
             <a:r>
               <a:rPr lang="en-GB" sz="1800" dirty="0" smtClean="0"/>
@@ -3320,8 +3421,32 @@
             </a:r>
             <a:r>
               <a:rPr lang="en-GB" sz="1800" dirty="0"/>
-              <a:t> working together.</a:t>
-            </a:r>
+              <a:t> working </a:t>
+            </a:r>
+            <a:r>
+              <a:rPr lang="en-GB" sz="1800" dirty="0" smtClean="0"/>
+              <a:t>together</a:t>
+            </a:r>
+          </a:p>
+          <a:p>
+            <a:pPr>
+              <a:lnSpc>
+                <a:spcPct val="110000"/>
+              </a:lnSpc>
+            </a:pPr>
+            <a:r>
+              <a:rPr lang="en-GB" sz="1800" dirty="0" smtClean="0"/>
+              <a:t>Knowing what we are all working on </a:t>
+            </a:r>
+            <a:r>
+              <a:rPr lang="mr-IN" sz="1800" dirty="0" smtClean="0"/>
+              <a:t>–</a:t>
+            </a:r>
+            <a:r>
+              <a:rPr lang="en-GB" sz="1800" dirty="0" smtClean="0"/>
+              <a:t> to avoid duplication of effort / do more by doing together</a:t>
+            </a:r>
+            <a:endParaRPr lang="en-GB" sz="1800" dirty="0"/>
           </a:p>
           <a:p>
             <a:endParaRPr lang="en-GB" sz="2000" dirty="0"/>
@@ -3337,6 +3462,387 @@
   </p:cSld>
   <p:clrMapOvr>
     <a:overrideClrMapping bg1="lt1" tx1="dk1" bg2="lt2" tx2="dk2" accent1="accent1" accent2="accent2" accent3="accent3" accent4="accent4" accent5="accent5" accent6="accent6" hlink="hlink" folHlink="folHlink"/>
+  </p:clrMapOvr>
+</p:sld>
+</file>
+
+<file path=ppt/slides/slide3.xml><?xml version="1.0" encoding="utf-8"?>
+<p:sld xmlns:a="http://schemas.openxmlformats.org/drawingml/2006/main" xmlns:r="http://schemas.openxmlformats.org/officeDocument/2006/relationships" xmlns:p="http://schemas.openxmlformats.org/presentationml/2006/main">
+  <p:cSld>
+    <p:spTree>
+      <p:nvGrpSpPr>
+        <p:cNvPr id="1" name=""/>
+        <p:cNvGrpSpPr/>
+        <p:nvPr/>
+      </p:nvGrpSpPr>
+      <p:grpSpPr>
+        <a:xfrm>
+          <a:off x="0" y="0"/>
+          <a:ext cx="0" cy="0"/>
+          <a:chOff x="0" y="0"/>
+          <a:chExt cx="0" cy="0"/>
+        </a:xfrm>
+      </p:grpSpPr>
+      <p:sp>
+        <p:nvSpPr>
+          <p:cNvPr id="2" name="Title 1"/>
+          <p:cNvSpPr>
+            <a:spLocks noGrp="1"/>
+          </p:cNvSpPr>
+          <p:nvPr>
+            <p:ph type="title"/>
+          </p:nvPr>
+        </p:nvSpPr>
+        <p:spPr/>
+        <p:txBody>
+          <a:bodyPr/>
+          <a:lstStyle/>
+          <a:p>
+            <a:r>
+              <a:rPr lang="en-GB" dirty="0" smtClean="0"/>
+              <a:t>London School of Economics</a:t>
+            </a:r>
+            <a:endParaRPr lang="en-GB" dirty="0"/>
+          </a:p>
+        </p:txBody>
+      </p:sp>
+      <p:sp>
+        <p:nvSpPr>
+          <p:cNvPr id="3" name="Content Placeholder 2"/>
+          <p:cNvSpPr>
+            <a:spLocks noGrp="1"/>
+          </p:cNvSpPr>
+          <p:nvPr>
+            <p:ph idx="1"/>
+          </p:nvPr>
+        </p:nvSpPr>
+        <p:spPr>
+          <a:xfrm>
+            <a:off x="838200" y="1816915"/>
+            <a:ext cx="10515600" cy="4653553"/>
+          </a:xfrm>
+        </p:spPr>
+        <p:txBody>
+          <a:bodyPr>
+            <a:normAutofit/>
+          </a:bodyPr>
+          <a:lstStyle/>
+          <a:p>
+            <a:pPr marL="0" indent="0">
+              <a:buNone/>
+            </a:pPr>
+            <a:r>
+              <a:rPr lang="en-GB" sz="2000" dirty="0" smtClean="0"/>
+              <a:t>What additional technologies are you using with Moodle?</a:t>
+            </a:r>
+          </a:p>
+          <a:p>
+            <a:r>
+              <a:rPr lang="en-GB" sz="1800" dirty="0" err="1" smtClean="0"/>
+              <a:t>Turnitin</a:t>
+            </a:r>
+            <a:r>
+              <a:rPr lang="en-GB" sz="1800" dirty="0" smtClean="0"/>
+              <a:t> , </a:t>
+            </a:r>
+            <a:r>
+              <a:rPr lang="en-GB" sz="1800" dirty="0" err="1" smtClean="0"/>
+              <a:t>Talis</a:t>
+            </a:r>
+            <a:r>
+              <a:rPr lang="en-GB" sz="1800" dirty="0" smtClean="0"/>
+              <a:t> Aspire Reading Lists, Coursework (in pilot), </a:t>
+            </a:r>
+            <a:r>
+              <a:rPr lang="en-GB" sz="1800" dirty="0" err="1" smtClean="0"/>
+              <a:t>Etherpad</a:t>
+            </a:r>
+            <a:r>
+              <a:rPr lang="en-GB" sz="1800" dirty="0" smtClean="0"/>
+              <a:t>, Scheduler, Zoom Web Conferencing</a:t>
+            </a:r>
+          </a:p>
+          <a:p>
+            <a:pPr marL="0" indent="0">
+              <a:buNone/>
+            </a:pPr>
+            <a:r>
+              <a:rPr lang="en-GB" sz="2000" dirty="0" smtClean="0"/>
+              <a:t>How are you using them?</a:t>
+            </a:r>
+          </a:p>
+          <a:p>
+            <a:r>
+              <a:rPr lang="en-GB" sz="1800" dirty="0" err="1" smtClean="0"/>
+              <a:t>Etherpad</a:t>
+            </a:r>
+            <a:r>
+              <a:rPr lang="en-GB" sz="1800" dirty="0" smtClean="0"/>
+              <a:t> is a collaborative writing tool, like a private Google Docs</a:t>
+            </a:r>
+          </a:p>
+          <a:p>
+            <a:r>
+              <a:rPr lang="en-GB" sz="1800" dirty="0" smtClean="0"/>
+              <a:t>Scheduler helps with office hours</a:t>
+            </a:r>
+          </a:p>
+          <a:p>
+            <a:r>
+              <a:rPr lang="en-GB" sz="1800" dirty="0" smtClean="0"/>
+              <a:t>Zoom allows you to hold office hours remotely/virtually</a:t>
+            </a:r>
+            <a:endParaRPr lang="en-GB" sz="2000" dirty="0"/>
+          </a:p>
+          <a:p>
+            <a:pPr marL="0" indent="0">
+              <a:buNone/>
+            </a:pPr>
+            <a:r>
+              <a:rPr lang="en-GB" sz="2000" dirty="0" smtClean="0"/>
+              <a:t>How does this help/hinder staff?</a:t>
+            </a:r>
+          </a:p>
+          <a:p>
+            <a:r>
+              <a:rPr lang="en-GB" sz="1800" dirty="0" smtClean="0"/>
+              <a:t>We recommend </a:t>
+            </a:r>
+            <a:r>
+              <a:rPr lang="en-GB" sz="1800" dirty="0" err="1" smtClean="0"/>
+              <a:t>Turnitin</a:t>
+            </a:r>
+            <a:r>
+              <a:rPr lang="en-GB" sz="1800" dirty="0" smtClean="0"/>
+              <a:t> as plagiarism plug-in because it’s asynchronous, and we retain copies of submissions</a:t>
+            </a:r>
+          </a:p>
+          <a:p>
+            <a:r>
+              <a:rPr lang="en-GB" sz="1800" dirty="0" smtClean="0"/>
+              <a:t>Scheduler and Zoom help (we hope) reconcile the “lack of face-time” student complaint with the “empty office hours” staff complaint</a:t>
+            </a:r>
+          </a:p>
+          <a:p>
+            <a:r>
+              <a:rPr lang="en-GB" sz="1800" dirty="0" err="1" smtClean="0"/>
+              <a:t>Etherpad</a:t>
+            </a:r>
+            <a:r>
+              <a:rPr lang="en-GB" sz="1800" dirty="0" smtClean="0"/>
+              <a:t> has great potential for group work, but you can’t submit a pad as an assignment, nor does it support Groups &amp; Groupings!</a:t>
+            </a:r>
+          </a:p>
+        </p:txBody>
+      </p:sp>
+    </p:spTree>
+    <p:extLst>
+      <p:ext uri="{BB962C8B-B14F-4D97-AF65-F5344CB8AC3E}">
+        <p14:creationId xmlns:p14="http://schemas.microsoft.com/office/powerpoint/2010/main" val="441437393"/>
+      </p:ext>
+    </p:extLst>
+  </p:cSld>
+  <p:clrMapOvr>
+    <a:masterClrMapping/>
+  </p:clrMapOvr>
+</p:sld>
+</file>
+
+<file path=ppt/slides/slide4.xml><?xml version="1.0" encoding="utf-8"?>
+<p:sld xmlns:a="http://schemas.openxmlformats.org/drawingml/2006/main" xmlns:r="http://schemas.openxmlformats.org/officeDocument/2006/relationships" xmlns:p="http://schemas.openxmlformats.org/presentationml/2006/main">
+  <p:cSld>
+    <p:spTree>
+      <p:nvGrpSpPr>
+        <p:cNvPr id="1" name=""/>
+        <p:cNvGrpSpPr/>
+        <p:nvPr/>
+      </p:nvGrpSpPr>
+      <p:grpSpPr>
+        <a:xfrm>
+          <a:off x="0" y="0"/>
+          <a:ext cx="0" cy="0"/>
+          <a:chOff x="0" y="0"/>
+          <a:chExt cx="0" cy="0"/>
+        </a:xfrm>
+      </p:grpSpPr>
+      <p:sp>
+        <p:nvSpPr>
+          <p:cNvPr id="2" name="Title 1"/>
+          <p:cNvSpPr>
+            <a:spLocks noGrp="1"/>
+          </p:cNvSpPr>
+          <p:nvPr>
+            <p:ph type="title"/>
+          </p:nvPr>
+        </p:nvSpPr>
+        <p:spPr/>
+        <p:txBody>
+          <a:bodyPr/>
+          <a:lstStyle/>
+          <a:p>
+            <a:r>
+              <a:rPr lang="en-GB" dirty="0" smtClean="0"/>
+              <a:t>London School of Economics</a:t>
+            </a:r>
+            <a:endParaRPr lang="en-GB" dirty="0"/>
+          </a:p>
+        </p:txBody>
+      </p:sp>
+      <p:sp>
+        <p:nvSpPr>
+          <p:cNvPr id="3" name="Content Placeholder 2"/>
+          <p:cNvSpPr>
+            <a:spLocks noGrp="1"/>
+          </p:cNvSpPr>
+          <p:nvPr>
+            <p:ph idx="1"/>
+          </p:nvPr>
+        </p:nvSpPr>
+        <p:spPr>
+          <a:xfrm>
+            <a:off x="838199" y="1816915"/>
+            <a:ext cx="10630989" cy="4653553"/>
+          </a:xfrm>
+        </p:spPr>
+        <p:txBody>
+          <a:bodyPr>
+            <a:noAutofit/>
+          </a:bodyPr>
+          <a:lstStyle/>
+          <a:p>
+            <a:pPr marL="0" indent="0">
+              <a:buNone/>
+            </a:pPr>
+            <a:r>
+              <a:rPr lang="en-GB" sz="2000" dirty="0" smtClean="0"/>
+              <a:t>What issues and challenges does your institution face?</a:t>
+            </a:r>
+          </a:p>
+          <a:p>
+            <a:pPr>
+              <a:lnSpc>
+                <a:spcPct val="110000"/>
+              </a:lnSpc>
+            </a:pPr>
+            <a:r>
+              <a:rPr lang="en-GB" sz="1800" dirty="0" smtClean="0"/>
+              <a:t>Dismal NSS scores</a:t>
+            </a:r>
+          </a:p>
+          <a:p>
+            <a:pPr>
+              <a:lnSpc>
+                <a:spcPct val="110000"/>
+              </a:lnSpc>
+            </a:pPr>
+            <a:r>
+              <a:rPr lang="en-GB" sz="1800" dirty="0" smtClean="0"/>
+              <a:t>Always-on requirement for IT.  Carrier grade reliability on a budget.  Need better monitoring</a:t>
+            </a:r>
+            <a:endParaRPr lang="en-GB" sz="2000" dirty="0" smtClean="0"/>
+          </a:p>
+          <a:p>
+            <a:pPr marL="0" indent="0">
+              <a:buNone/>
+            </a:pPr>
+            <a:r>
+              <a:rPr lang="en-GB" sz="2000" dirty="0" smtClean="0"/>
+              <a:t>Ideas for future development</a:t>
+            </a:r>
+          </a:p>
+          <a:p>
+            <a:pPr>
+              <a:lnSpc>
+                <a:spcPct val="110000"/>
+              </a:lnSpc>
+            </a:pPr>
+            <a:r>
+              <a:rPr lang="en-GB" sz="1800" dirty="0" smtClean="0"/>
+              <a:t>Develop </a:t>
+            </a:r>
+            <a:r>
+              <a:rPr lang="en-GB" sz="1800" dirty="0" err="1" smtClean="0"/>
+              <a:t>Etherpad</a:t>
+            </a:r>
+            <a:r>
+              <a:rPr lang="en-GB" sz="1800" dirty="0" smtClean="0"/>
+              <a:t> so it can be used as an assignment type, and support groups &amp; groupings</a:t>
+            </a:r>
+          </a:p>
+          <a:p>
+            <a:pPr>
+              <a:lnSpc>
+                <a:spcPct val="110000"/>
+              </a:lnSpc>
+            </a:pPr>
+            <a:r>
+              <a:rPr lang="en-GB" sz="1800" dirty="0" smtClean="0"/>
+              <a:t>Develop suite of monitoring/profiling tools</a:t>
+            </a:r>
+            <a:endParaRPr lang="en-GB" sz="1800" dirty="0"/>
+          </a:p>
+          <a:p>
+            <a:pPr marL="0" indent="0">
+              <a:buNone/>
+            </a:pPr>
+            <a:r>
+              <a:rPr lang="en-GB" sz="2000" dirty="0" smtClean="0"/>
+              <a:t> What do you see as collaboration opportunities?</a:t>
+            </a:r>
+          </a:p>
+          <a:p>
+            <a:pPr>
+              <a:lnSpc>
+                <a:spcPct val="110000"/>
+              </a:lnSpc>
+            </a:pPr>
+            <a:r>
+              <a:rPr lang="en-GB" sz="1800" dirty="0" smtClean="0"/>
+              <a:t>Social coding!</a:t>
+            </a:r>
+          </a:p>
+          <a:p>
+            <a:pPr marL="0" indent="0">
+              <a:buNone/>
+            </a:pPr>
+            <a:r>
+              <a:rPr lang="en-GB" sz="2000" dirty="0" smtClean="0"/>
+              <a:t> What would help you?</a:t>
+            </a:r>
+          </a:p>
+          <a:p>
+            <a:pPr>
+              <a:lnSpc>
+                <a:spcPct val="110000"/>
+              </a:lnSpc>
+            </a:pPr>
+            <a:r>
+              <a:rPr lang="en-GB" sz="1800" dirty="0" smtClean="0"/>
+              <a:t>Knowing what everyone else is up to.  Post to the list, write on </a:t>
+            </a:r>
+            <a:r>
+              <a:rPr lang="en-GB" sz="1800" smtClean="0"/>
+              <a:t>the wiki, etc.</a:t>
+            </a:r>
+            <a:endParaRPr lang="en-GB" sz="1800" dirty="0"/>
+          </a:p>
+          <a:p>
+            <a:pPr marL="0" indent="0">
+              <a:buNone/>
+            </a:pPr>
+            <a:endParaRPr lang="en-GB" sz="2000" dirty="0"/>
+          </a:p>
+        </p:txBody>
+      </p:sp>
+    </p:spTree>
+    <p:extLst>
+      <p:ext uri="{BB962C8B-B14F-4D97-AF65-F5344CB8AC3E}">
+        <p14:creationId xmlns:p14="http://schemas.microsoft.com/office/powerpoint/2010/main" val="2737838512"/>
+      </p:ext>
+    </p:extLst>
+  </p:cSld>
+  <p:clrMapOvr>
+    <a:masterClrMapping/>
   </p:clrMapOvr>
 </p:sld>
 </file>
@@ -3605,7 +4111,7 @@
   <a:extraClrSchemeLst/>
   <a:extLst>
     <a:ext uri="{05A4C25C-085E-4340-85A3-A5531E510DB2}">
-      <thm15:themeFamily xmlns:thm15="http://schemas.microsoft.com/office/thememl/2012/main" name="Office Theme" id="{62F939B6-93AF-4DB8-9C6B-D6C7DFDC589F}" vid="{4A3C46E8-61CC-4603-A589-7422A47A8E4A}"/>
+      <thm15:themeFamily xmlns="" xmlns:thm15="http://schemas.microsoft.com/office/thememl/2012/main" name="Office Theme" id="{62F939B6-93AF-4DB8-9C6B-D6C7DFDC589F}" vid="{4A3C46E8-61CC-4603-A589-7422A47A8E4A}"/>
     </a:ext>
   </a:extLst>
 </a:theme>

</xml_diff>